<commit_message>
Programa a su aproximadamente 92%
</commit_message>
<xml_diff>
--- a/Presentación.pptx
+++ b/Presentación.pptx
@@ -15866,7 +15866,7 @@
           <a:p>
             <a:r>
               <a:rPr lang="es-MX" dirty="0"/>
-              <a:t>Diagrama de clases: </a:t>
+              <a:t>Diagrama de clases (paquetes): </a:t>
             </a:r>
           </a:p>
         </p:txBody>
@@ -18129,8 +18129,29 @@
                 <a:ea typeface="Calibri" panose="020F0502020204030204" pitchFamily="34" charset="0"/>
                 <a:cs typeface="Arial" panose="020B0604020202020204" pitchFamily="34" charset="0"/>
               </a:rPr>
-              <a:t>trica</a:t>
+              <a:t>trica (</a:t>
             </a:r>
+            <a:r>
+              <a:rPr lang="es-MX" altLang="es-MX" sz="2400" b="1" dirty="0" err="1">
+                <a:latin typeface="Arial" panose="020B0604020202020204" pitchFamily="34" charset="0"/>
+                <a:ea typeface="Calibri" panose="020F0502020204030204" pitchFamily="34" charset="0"/>
+                <a:cs typeface="Arial" panose="020B0604020202020204" pitchFamily="34" charset="0"/>
+              </a:rPr>
+              <a:t>2da</a:t>
+            </a:r>
+            <a:r>
+              <a:rPr lang="es-MX" altLang="es-MX" sz="2400" b="1">
+                <a:latin typeface="Arial" panose="020B0604020202020204" pitchFamily="34" charset="0"/>
+                <a:ea typeface="Calibri" panose="020F0502020204030204" pitchFamily="34" charset="0"/>
+                <a:cs typeface="Arial" panose="020B0604020202020204" pitchFamily="34" charset="0"/>
+              </a:rPr>
+              <a:t> entrega).</a:t>
+            </a:r>
+            <a:endParaRPr lang="es-MX" altLang="es-MX" sz="2400" b="1" dirty="0">
+              <a:latin typeface="Arial" panose="020B0604020202020204" pitchFamily="34" charset="0"/>
+              <a:ea typeface="Calibri" panose="020F0502020204030204" pitchFamily="34" charset="0"/>
+              <a:cs typeface="Arial" panose="020B0604020202020204" pitchFamily="34" charset="0"/>
+            </a:endParaRPr>
           </a:p>
           <a:p>
             <a:pPr lvl="0" defTabSz="914400" eaLnBrk="0" fontAlgn="base" hangingPunct="0">
@@ -18292,28 +18313,28 @@
             <p:ph idx="1"/>
             <p:extLst>
               <p:ext uri="{D42A27DB-BD31-4B8C-83A1-F6EECF244321}">
-                <p14:modId xmlns:p14="http://schemas.microsoft.com/office/powerpoint/2010/main" val="2449119775"/>
+                <p14:modId xmlns:p14="http://schemas.microsoft.com/office/powerpoint/2010/main" val="4062815271"/>
               </p:ext>
             </p:extLst>
           </p:nvPr>
         </p:nvGraphicFramePr>
         <p:xfrm>
           <a:off x="3937685" y="2133601"/>
-          <a:ext cx="7492316" cy="3120135"/>
+          <a:ext cx="7492316" cy="2970572"/>
         </p:xfrm>
         <a:graphic>
           <a:graphicData uri="http://schemas.openxmlformats.org/drawingml/2006/table">
             <a:tbl>
               <a:tblPr firstRow="1" firstCol="1" bandRow="1"/>
               <a:tblGrid>
-                <a:gridCol w="1598949">
+                <a:gridCol w="1828115">
                   <a:extLst>
                     <a:ext uri="{9D8B030D-6E8A-4147-A177-3AD203B41FA5}">
                       <a16:colId xmlns:a16="http://schemas.microsoft.com/office/drawing/2014/main" val="3942864946"/>
                     </a:ext>
                   </a:extLst>
                 </a:gridCol>
-                <a:gridCol w="1154231">
+                <a:gridCol w="925065">
                   <a:extLst>
                     <a:ext uri="{9D8B030D-6E8A-4147-A177-3AD203B41FA5}">
                       <a16:colId xmlns:a16="http://schemas.microsoft.com/office/drawing/2014/main" val="490554452"/>
@@ -19224,7 +19245,7 @@
                         </a:spcAft>
                       </a:pPr>
                       <a:r>
-                        <a:rPr lang="es-MX" sz="1800">
+                        <a:rPr lang="es-MX" sz="1800" dirty="0">
                           <a:effectLst/>
                           <a:latin typeface="Arial" panose="020B0604020202020204" pitchFamily="34" charset="0"/>
                           <a:ea typeface="Calibri" panose="020F0502020204030204" pitchFamily="34" charset="0"/>
@@ -19232,7 +19253,7 @@
                         </a:rPr>
                         <a:t>Documentación</a:t>
                       </a:r>
-                      <a:endParaRPr lang="es-MX" sz="1600">
+                      <a:endParaRPr lang="es-MX" sz="1600" dirty="0">
                         <a:effectLst/>
                         <a:latin typeface="Calibri" panose="020F0502020204030204" pitchFamily="34" charset="0"/>
                         <a:ea typeface="Calibri" panose="020F0502020204030204" pitchFamily="34" charset="0"/>
@@ -22708,7 +22729,7 @@
                   <a:srgbClr val="000000"/>
                 </a:solidFill>
               </a:rPr>
-              <a:t>Si el usuario olvidó su contraseña, entonces selecciona “¿Olvidaste tu contraseña?” en donde debe de ingresar su matrícula o correo electrónico Gmail, Al cual se le enviará un código de seguridad que deberá ingresar para hacer el correcto cambio de contraseña</a:t>
+              <a:t>Si el usuario olvidó su contraseña, entonces selecciona “¿Olvidaste tu contraseña?” en donde debe de ingresar su matrícula o correo electrónico Gmail, al cual se le enviará un código de seguridad que deberá ingresar para hacer el correcto cambio de contraseña</a:t>
             </a:r>
           </a:p>
           <a:p>

</xml_diff>

<commit_message>
actualizacion docs 80 porciento
</commit_message>
<xml_diff>
--- a/Presentación.pptx
+++ b/Presentación.pptx
@@ -16,9 +16,10 @@
     <p:sldId id="269" r:id="rId10"/>
     <p:sldId id="271" r:id="rId11"/>
     <p:sldId id="270" r:id="rId12"/>
-    <p:sldId id="266" r:id="rId13"/>
-    <p:sldId id="267" r:id="rId14"/>
-    <p:sldId id="268" r:id="rId15"/>
+    <p:sldId id="272" r:id="rId13"/>
+    <p:sldId id="266" r:id="rId14"/>
+    <p:sldId id="267" r:id="rId15"/>
+    <p:sldId id="268" r:id="rId16"/>
   </p:sldIdLst>
   <p:sldSz cx="12192000" cy="6858000"/>
   <p:notesSz cx="6858000" cy="9144000"/>
@@ -123,6 +124,367 @@
     </p:ext>
   </p:extLst>
 </p:presentation>
+</file>
+
+<file path=ppt/revisionInfo.xml><?xml version="1.0" encoding="utf-8"?>
+<p1510:revInfo xmlns:a="http://schemas.openxmlformats.org/drawingml/2006/main" xmlns:r="http://schemas.openxmlformats.org/officeDocument/2006/relationships" xmlns:p1510="http://schemas.microsoft.com/office/powerpoint/2015/10/main">
+  <p1510:revLst>
+    <p1510:client id="{42C36324-0F42-4A1C-A743-D757D7FC3EB1}" v="11" dt="2018-12-06T05:53:12.824"/>
+  </p1510:revLst>
+</p1510:revInfo>
+</file>
+
+<file path=ppt/changesInfos/changesInfo1.xml><?xml version="1.0" encoding="utf-8"?>
+<pc:chgInfo xmlns:a="http://schemas.openxmlformats.org/drawingml/2006/main" xmlns:r="http://schemas.openxmlformats.org/officeDocument/2006/relationships" xmlns:ac="http://schemas.microsoft.com/office/drawing/2013/main/command" xmlns:pc="http://schemas.microsoft.com/office/powerpoint/2013/main/command">
+  <pc:docChgLst>
+    <pc:chgData name="JESUS ANTONIO PACHECO BALAM" userId="4d3f669a-bb26-43d9-97fa-e6e4457b6ec0" providerId="ADAL" clId="{42C36324-0F42-4A1C-A743-D757D7FC3EB1}"/>
+    <pc:docChg chg="undo custSel mod addSld delSld modSld">
+      <pc:chgData name="JESUS ANTONIO PACHECO BALAM" userId="4d3f669a-bb26-43d9-97fa-e6e4457b6ec0" providerId="ADAL" clId="{42C36324-0F42-4A1C-A743-D757D7FC3EB1}" dt="2018-12-06T05:57:39.078" v="42" actId="1076"/>
+      <pc:docMkLst>
+        <pc:docMk/>
+      </pc:docMkLst>
+      <pc:sldChg chg="addSp delSp modSp mod setBg">
+        <pc:chgData name="JESUS ANTONIO PACHECO BALAM" userId="4d3f669a-bb26-43d9-97fa-e6e4457b6ec0" providerId="ADAL" clId="{42C36324-0F42-4A1C-A743-D757D7FC3EB1}" dt="2018-12-06T05:57:39.078" v="42" actId="1076"/>
+        <pc:sldMkLst>
+          <pc:docMk/>
+          <pc:sldMk cId="704844681" sldId="270"/>
+        </pc:sldMkLst>
+        <pc:spChg chg="mod ord">
+          <ac:chgData name="JESUS ANTONIO PACHECO BALAM" userId="4d3f669a-bb26-43d9-97fa-e6e4457b6ec0" providerId="ADAL" clId="{42C36324-0F42-4A1C-A743-D757D7FC3EB1}" dt="2018-12-06T05:52:20.072" v="24" actId="26606"/>
+          <ac:spMkLst>
+            <pc:docMk/>
+            <pc:sldMk cId="704844681" sldId="270"/>
+            <ac:spMk id="2" creationId="{2515427B-DF94-4FB2-A844-ABB19C1007F0}"/>
+          </ac:spMkLst>
+        </pc:spChg>
+        <pc:spChg chg="add del">
+          <ac:chgData name="JESUS ANTONIO PACHECO BALAM" userId="4d3f669a-bb26-43d9-97fa-e6e4457b6ec0" providerId="ADAL" clId="{42C36324-0F42-4A1C-A743-D757D7FC3EB1}" dt="2018-12-06T05:52:06.503" v="12" actId="26606"/>
+          <ac:spMkLst>
+            <pc:docMk/>
+            <pc:sldMk cId="704844681" sldId="270"/>
+            <ac:spMk id="9" creationId="{17115F77-2FAE-4CA7-9A7F-10D5F2C8F831}"/>
+          </ac:spMkLst>
+        </pc:spChg>
+        <pc:spChg chg="add del">
+          <ac:chgData name="JESUS ANTONIO PACHECO BALAM" userId="4d3f669a-bb26-43d9-97fa-e6e4457b6ec0" providerId="ADAL" clId="{42C36324-0F42-4A1C-A743-D757D7FC3EB1}" dt="2018-12-06T05:52:06.503" v="12" actId="26606"/>
+          <ac:spMkLst>
+            <pc:docMk/>
+            <pc:sldMk cId="704844681" sldId="270"/>
+            <ac:spMk id="11" creationId="{5CD4C046-A04C-46CC-AFA3-6B0621F628C8}"/>
+          </ac:spMkLst>
+        </pc:spChg>
+        <pc:spChg chg="add del">
+          <ac:chgData name="JESUS ANTONIO PACHECO BALAM" userId="4d3f669a-bb26-43d9-97fa-e6e4457b6ec0" providerId="ADAL" clId="{42C36324-0F42-4A1C-A743-D757D7FC3EB1}" dt="2018-12-06T05:52:06.503" v="12" actId="26606"/>
+          <ac:spMkLst>
+            <pc:docMk/>
+            <pc:sldMk cId="704844681" sldId="270"/>
+            <ac:spMk id="13" creationId="{66C7A97A-A7DE-4DFB-8542-1E4BF24C7D31}"/>
+          </ac:spMkLst>
+        </pc:spChg>
+        <pc:spChg chg="add del">
+          <ac:chgData name="JESUS ANTONIO PACHECO BALAM" userId="4d3f669a-bb26-43d9-97fa-e6e4457b6ec0" providerId="ADAL" clId="{42C36324-0F42-4A1C-A743-D757D7FC3EB1}" dt="2018-12-06T05:52:06.503" v="12" actId="26606"/>
+          <ac:spMkLst>
+            <pc:docMk/>
+            <pc:sldMk cId="704844681" sldId="270"/>
+            <ac:spMk id="15" creationId="{BE111DB0-3D73-4D20-9D57-CEF5A0D865B9}"/>
+          </ac:spMkLst>
+        </pc:spChg>
+        <pc:spChg chg="add del">
+          <ac:chgData name="JESUS ANTONIO PACHECO BALAM" userId="4d3f669a-bb26-43d9-97fa-e6e4457b6ec0" providerId="ADAL" clId="{42C36324-0F42-4A1C-A743-D757D7FC3EB1}" dt="2018-12-06T05:52:06.503" v="12" actId="26606"/>
+          <ac:spMkLst>
+            <pc:docMk/>
+            <pc:sldMk cId="704844681" sldId="270"/>
+            <ac:spMk id="17" creationId="{027ADCA0-A066-4B16-8E1F-3C2483947B72}"/>
+          </ac:spMkLst>
+        </pc:spChg>
+        <pc:spChg chg="add del">
+          <ac:chgData name="JESUS ANTONIO PACHECO BALAM" userId="4d3f669a-bb26-43d9-97fa-e6e4457b6ec0" providerId="ADAL" clId="{42C36324-0F42-4A1C-A743-D757D7FC3EB1}" dt="2018-12-06T05:52:07.970" v="14" actId="26606"/>
+          <ac:spMkLst>
+            <pc:docMk/>
+            <pc:sldMk cId="704844681" sldId="270"/>
+            <ac:spMk id="19" creationId="{DB8424AB-D56B-4256-866A-5B54DE93C20F}"/>
+          </ac:spMkLst>
+        </pc:spChg>
+        <pc:spChg chg="add del">
+          <ac:chgData name="JESUS ANTONIO PACHECO BALAM" userId="4d3f669a-bb26-43d9-97fa-e6e4457b6ec0" providerId="ADAL" clId="{42C36324-0F42-4A1C-A743-D757D7FC3EB1}" dt="2018-12-06T05:52:07.970" v="14" actId="26606"/>
+          <ac:spMkLst>
+            <pc:docMk/>
+            <pc:sldMk cId="704844681" sldId="270"/>
+            <ac:spMk id="20" creationId="{FC999C28-AD33-4EB7-A5F1-C06D10A5FDF7}"/>
+          </ac:spMkLst>
+        </pc:spChg>
+        <pc:spChg chg="add del">
+          <ac:chgData name="JESUS ANTONIO PACHECO BALAM" userId="4d3f669a-bb26-43d9-97fa-e6e4457b6ec0" providerId="ADAL" clId="{42C36324-0F42-4A1C-A743-D757D7FC3EB1}" dt="2018-12-06T05:52:07.970" v="14" actId="26606"/>
+          <ac:spMkLst>
+            <pc:docMk/>
+            <pc:sldMk cId="704844681" sldId="270"/>
+            <ac:spMk id="21" creationId="{0864E5C9-52C9-4572-AC75-548B9B9C2648}"/>
+          </ac:spMkLst>
+        </pc:spChg>
+        <pc:spChg chg="add del">
+          <ac:chgData name="JESUS ANTONIO PACHECO BALAM" userId="4d3f669a-bb26-43d9-97fa-e6e4457b6ec0" providerId="ADAL" clId="{42C36324-0F42-4A1C-A743-D757D7FC3EB1}" dt="2018-12-06T05:52:07.970" v="14" actId="26606"/>
+          <ac:spMkLst>
+            <pc:docMk/>
+            <pc:sldMk cId="704844681" sldId="270"/>
+            <ac:spMk id="22" creationId="{45CC6500-4DBD-4C34-BC14-2387FB483BEB}"/>
+          </ac:spMkLst>
+        </pc:spChg>
+        <pc:spChg chg="add del">
+          <ac:chgData name="JESUS ANTONIO PACHECO BALAM" userId="4d3f669a-bb26-43d9-97fa-e6e4457b6ec0" providerId="ADAL" clId="{42C36324-0F42-4A1C-A743-D757D7FC3EB1}" dt="2018-12-06T05:52:07.970" v="14" actId="26606"/>
+          <ac:spMkLst>
+            <pc:docMk/>
+            <pc:sldMk cId="704844681" sldId="270"/>
+            <ac:spMk id="23" creationId="{4E34A3B6-BAD2-4156-BDC6-4736248BFDE0}"/>
+          </ac:spMkLst>
+        </pc:spChg>
+        <pc:spChg chg="add del">
+          <ac:chgData name="JESUS ANTONIO PACHECO BALAM" userId="4d3f669a-bb26-43d9-97fa-e6e4457b6ec0" providerId="ADAL" clId="{42C36324-0F42-4A1C-A743-D757D7FC3EB1}" dt="2018-12-06T05:52:09.094" v="16" actId="26606"/>
+          <ac:spMkLst>
+            <pc:docMk/>
+            <pc:sldMk cId="704844681" sldId="270"/>
+            <ac:spMk id="25" creationId="{DB8424AB-D56B-4256-866A-5B54DE93C20F}"/>
+          </ac:spMkLst>
+        </pc:spChg>
+        <pc:spChg chg="add del">
+          <ac:chgData name="JESUS ANTONIO PACHECO BALAM" userId="4d3f669a-bb26-43d9-97fa-e6e4457b6ec0" providerId="ADAL" clId="{42C36324-0F42-4A1C-A743-D757D7FC3EB1}" dt="2018-12-06T05:52:09.094" v="16" actId="26606"/>
+          <ac:spMkLst>
+            <pc:docMk/>
+            <pc:sldMk cId="704844681" sldId="270"/>
+            <ac:spMk id="26" creationId="{FC999C28-AD33-4EB7-A5F1-C06D10A5FDF7}"/>
+          </ac:spMkLst>
+        </pc:spChg>
+        <pc:spChg chg="add del">
+          <ac:chgData name="JESUS ANTONIO PACHECO BALAM" userId="4d3f669a-bb26-43d9-97fa-e6e4457b6ec0" providerId="ADAL" clId="{42C36324-0F42-4A1C-A743-D757D7FC3EB1}" dt="2018-12-06T05:52:09.094" v="16" actId="26606"/>
+          <ac:spMkLst>
+            <pc:docMk/>
+            <pc:sldMk cId="704844681" sldId="270"/>
+            <ac:spMk id="27" creationId="{69373E92-F88D-4F0A-94DF-393703E7DA7D}"/>
+          </ac:spMkLst>
+        </pc:spChg>
+        <pc:spChg chg="add del">
+          <ac:chgData name="JESUS ANTONIO PACHECO BALAM" userId="4d3f669a-bb26-43d9-97fa-e6e4457b6ec0" providerId="ADAL" clId="{42C36324-0F42-4A1C-A743-D757D7FC3EB1}" dt="2018-12-06T05:52:09.094" v="16" actId="26606"/>
+          <ac:spMkLst>
+            <pc:docMk/>
+            <pc:sldMk cId="704844681" sldId="270"/>
+            <ac:spMk id="28" creationId="{C629DAA0-ADF6-43FD-9C99-483F722B56E2}"/>
+          </ac:spMkLst>
+        </pc:spChg>
+        <pc:spChg chg="add del">
+          <ac:chgData name="JESUS ANTONIO PACHECO BALAM" userId="4d3f669a-bb26-43d9-97fa-e6e4457b6ec0" providerId="ADAL" clId="{42C36324-0F42-4A1C-A743-D757D7FC3EB1}" dt="2018-12-06T05:52:09.094" v="16" actId="26606"/>
+          <ac:spMkLst>
+            <pc:docMk/>
+            <pc:sldMk cId="704844681" sldId="270"/>
+            <ac:spMk id="29" creationId="{F32C8C35-BF44-4CFB-9754-81F07C9812A7}"/>
+          </ac:spMkLst>
+        </pc:spChg>
+        <pc:spChg chg="add del">
+          <ac:chgData name="JESUS ANTONIO PACHECO BALAM" userId="4d3f669a-bb26-43d9-97fa-e6e4457b6ec0" providerId="ADAL" clId="{42C36324-0F42-4A1C-A743-D757D7FC3EB1}" dt="2018-12-06T05:52:10.299" v="18" actId="26606"/>
+          <ac:spMkLst>
+            <pc:docMk/>
+            <pc:sldMk cId="704844681" sldId="270"/>
+            <ac:spMk id="31" creationId="{DB8424AB-D56B-4256-866A-5B54DE93C20F}"/>
+          </ac:spMkLst>
+        </pc:spChg>
+        <pc:spChg chg="add del">
+          <ac:chgData name="JESUS ANTONIO PACHECO BALAM" userId="4d3f669a-bb26-43d9-97fa-e6e4457b6ec0" providerId="ADAL" clId="{42C36324-0F42-4A1C-A743-D757D7FC3EB1}" dt="2018-12-06T05:52:10.299" v="18" actId="26606"/>
+          <ac:spMkLst>
+            <pc:docMk/>
+            <pc:sldMk cId="704844681" sldId="270"/>
+            <ac:spMk id="32" creationId="{FC999C28-AD33-4EB7-A5F1-C06D10A5FDF7}"/>
+          </ac:spMkLst>
+        </pc:spChg>
+        <pc:spChg chg="add del">
+          <ac:chgData name="JESUS ANTONIO PACHECO BALAM" userId="4d3f669a-bb26-43d9-97fa-e6e4457b6ec0" providerId="ADAL" clId="{42C36324-0F42-4A1C-A743-D757D7FC3EB1}" dt="2018-12-06T05:52:10.299" v="18" actId="26606"/>
+          <ac:spMkLst>
+            <pc:docMk/>
+            <pc:sldMk cId="704844681" sldId="270"/>
+            <ac:spMk id="33" creationId="{07CBBDD0-4420-4A50-96AB-392F9B97CF03}"/>
+          </ac:spMkLst>
+        </pc:spChg>
+        <pc:spChg chg="add del">
+          <ac:chgData name="JESUS ANTONIO PACHECO BALAM" userId="4d3f669a-bb26-43d9-97fa-e6e4457b6ec0" providerId="ADAL" clId="{42C36324-0F42-4A1C-A743-D757D7FC3EB1}" dt="2018-12-06T05:52:10.299" v="18" actId="26606"/>
+          <ac:spMkLst>
+            <pc:docMk/>
+            <pc:sldMk cId="704844681" sldId="270"/>
+            <ac:spMk id="34" creationId="{465BA403-54B9-4A0B-BC79-028C495C038E}"/>
+          </ac:spMkLst>
+        </pc:spChg>
+        <pc:spChg chg="add del">
+          <ac:chgData name="JESUS ANTONIO PACHECO BALAM" userId="4d3f669a-bb26-43d9-97fa-e6e4457b6ec0" providerId="ADAL" clId="{42C36324-0F42-4A1C-A743-D757D7FC3EB1}" dt="2018-12-06T05:52:10.299" v="18" actId="26606"/>
+          <ac:spMkLst>
+            <pc:docMk/>
+            <pc:sldMk cId="704844681" sldId="270"/>
+            <ac:spMk id="35" creationId="{DC8C6883-513A-4FE8-8B55-7AA2A13A9BB9}"/>
+          </ac:spMkLst>
+        </pc:spChg>
+        <pc:spChg chg="add del">
+          <ac:chgData name="JESUS ANTONIO PACHECO BALAM" userId="4d3f669a-bb26-43d9-97fa-e6e4457b6ec0" providerId="ADAL" clId="{42C36324-0F42-4A1C-A743-D757D7FC3EB1}" dt="2018-12-06T05:52:12.239" v="20" actId="26606"/>
+          <ac:spMkLst>
+            <pc:docMk/>
+            <pc:sldMk cId="704844681" sldId="270"/>
+            <ac:spMk id="37" creationId="{17115F77-2FAE-4CA7-9A7F-10D5F2C8F831}"/>
+          </ac:spMkLst>
+        </pc:spChg>
+        <pc:spChg chg="add del">
+          <ac:chgData name="JESUS ANTONIO PACHECO BALAM" userId="4d3f669a-bb26-43d9-97fa-e6e4457b6ec0" providerId="ADAL" clId="{42C36324-0F42-4A1C-A743-D757D7FC3EB1}" dt="2018-12-06T05:52:12.239" v="20" actId="26606"/>
+          <ac:spMkLst>
+            <pc:docMk/>
+            <pc:sldMk cId="704844681" sldId="270"/>
+            <ac:spMk id="38" creationId="{5CD4C046-A04C-46CC-AFA3-6B0621F628C8}"/>
+          </ac:spMkLst>
+        </pc:spChg>
+        <pc:spChg chg="add del">
+          <ac:chgData name="JESUS ANTONIO PACHECO BALAM" userId="4d3f669a-bb26-43d9-97fa-e6e4457b6ec0" providerId="ADAL" clId="{42C36324-0F42-4A1C-A743-D757D7FC3EB1}" dt="2018-12-06T05:52:12.239" v="20" actId="26606"/>
+          <ac:spMkLst>
+            <pc:docMk/>
+            <pc:sldMk cId="704844681" sldId="270"/>
+            <ac:spMk id="39" creationId="{A5A2BA67-BF68-4F48-BAA9-1091D4FED1F8}"/>
+          </ac:spMkLst>
+        </pc:spChg>
+        <pc:spChg chg="add del">
+          <ac:chgData name="JESUS ANTONIO PACHECO BALAM" userId="4d3f669a-bb26-43d9-97fa-e6e4457b6ec0" providerId="ADAL" clId="{42C36324-0F42-4A1C-A743-D757D7FC3EB1}" dt="2018-12-06T05:52:12.239" v="20" actId="26606"/>
+          <ac:spMkLst>
+            <pc:docMk/>
+            <pc:sldMk cId="704844681" sldId="270"/>
+            <ac:spMk id="40" creationId="{E4190DBD-4A62-4416-ACB7-ACEC1DE3024B}"/>
+          </ac:spMkLst>
+        </pc:spChg>
+        <pc:spChg chg="add del">
+          <ac:chgData name="JESUS ANTONIO PACHECO BALAM" userId="4d3f669a-bb26-43d9-97fa-e6e4457b6ec0" providerId="ADAL" clId="{42C36324-0F42-4A1C-A743-D757D7FC3EB1}" dt="2018-12-06T05:52:12.239" v="20" actId="26606"/>
+          <ac:spMkLst>
+            <pc:docMk/>
+            <pc:sldMk cId="704844681" sldId="270"/>
+            <ac:spMk id="41" creationId="{DBF12D6D-FE37-445A-BF16-6DA1A659A4D7}"/>
+          </ac:spMkLst>
+        </pc:spChg>
+        <pc:spChg chg="add del">
+          <ac:chgData name="JESUS ANTONIO PACHECO BALAM" userId="4d3f669a-bb26-43d9-97fa-e6e4457b6ec0" providerId="ADAL" clId="{42C36324-0F42-4A1C-A743-D757D7FC3EB1}" dt="2018-12-06T05:52:14.827" v="22" actId="26606"/>
+          <ac:spMkLst>
+            <pc:docMk/>
+            <pc:sldMk cId="704844681" sldId="270"/>
+            <ac:spMk id="43" creationId="{17115F77-2FAE-4CA7-9A7F-10D5F2C8F831}"/>
+          </ac:spMkLst>
+        </pc:spChg>
+        <pc:spChg chg="add del">
+          <ac:chgData name="JESUS ANTONIO PACHECO BALAM" userId="4d3f669a-bb26-43d9-97fa-e6e4457b6ec0" providerId="ADAL" clId="{42C36324-0F42-4A1C-A743-D757D7FC3EB1}" dt="2018-12-06T05:52:14.827" v="22" actId="26606"/>
+          <ac:spMkLst>
+            <pc:docMk/>
+            <pc:sldMk cId="704844681" sldId="270"/>
+            <ac:spMk id="44" creationId="{5CD4C046-A04C-46CC-AFA3-6B0621F628C8}"/>
+          </ac:spMkLst>
+        </pc:spChg>
+        <pc:spChg chg="add del">
+          <ac:chgData name="JESUS ANTONIO PACHECO BALAM" userId="4d3f669a-bb26-43d9-97fa-e6e4457b6ec0" providerId="ADAL" clId="{42C36324-0F42-4A1C-A743-D757D7FC3EB1}" dt="2018-12-06T05:52:14.827" v="22" actId="26606"/>
+          <ac:spMkLst>
+            <pc:docMk/>
+            <pc:sldMk cId="704844681" sldId="270"/>
+            <ac:spMk id="45" creationId="{D589E016-1EE1-484C-8423-012B4B78067D}"/>
+          </ac:spMkLst>
+        </pc:spChg>
+        <pc:spChg chg="add del">
+          <ac:chgData name="JESUS ANTONIO PACHECO BALAM" userId="4d3f669a-bb26-43d9-97fa-e6e4457b6ec0" providerId="ADAL" clId="{42C36324-0F42-4A1C-A743-D757D7FC3EB1}" dt="2018-12-06T05:52:14.827" v="22" actId="26606"/>
+          <ac:spMkLst>
+            <pc:docMk/>
+            <pc:sldMk cId="704844681" sldId="270"/>
+            <ac:spMk id="46" creationId="{46100866-3689-418C-84D9-07C7E2435C86}"/>
+          </ac:spMkLst>
+        </pc:spChg>
+        <pc:spChg chg="add del">
+          <ac:chgData name="JESUS ANTONIO PACHECO BALAM" userId="4d3f669a-bb26-43d9-97fa-e6e4457b6ec0" providerId="ADAL" clId="{42C36324-0F42-4A1C-A743-D757D7FC3EB1}" dt="2018-12-06T05:52:20.072" v="24" actId="26606"/>
+          <ac:spMkLst>
+            <pc:docMk/>
+            <pc:sldMk cId="704844681" sldId="270"/>
+            <ac:spMk id="48" creationId="{DB8424AB-D56B-4256-866A-5B54DE93C20F}"/>
+          </ac:spMkLst>
+        </pc:spChg>
+        <pc:spChg chg="add del">
+          <ac:chgData name="JESUS ANTONIO PACHECO BALAM" userId="4d3f669a-bb26-43d9-97fa-e6e4457b6ec0" providerId="ADAL" clId="{42C36324-0F42-4A1C-A743-D757D7FC3EB1}" dt="2018-12-06T05:52:20.072" v="24" actId="26606"/>
+          <ac:spMkLst>
+            <pc:docMk/>
+            <pc:sldMk cId="704844681" sldId="270"/>
+            <ac:spMk id="49" creationId="{FC999C28-AD33-4EB7-A5F1-C06D10A5FDF7}"/>
+          </ac:spMkLst>
+        </pc:spChg>
+        <pc:spChg chg="add del">
+          <ac:chgData name="JESUS ANTONIO PACHECO BALAM" userId="4d3f669a-bb26-43d9-97fa-e6e4457b6ec0" providerId="ADAL" clId="{42C36324-0F42-4A1C-A743-D757D7FC3EB1}" dt="2018-12-06T05:52:20.072" v="24" actId="26606"/>
+          <ac:spMkLst>
+            <pc:docMk/>
+            <pc:sldMk cId="704844681" sldId="270"/>
+            <ac:spMk id="50" creationId="{0864E5C9-52C9-4572-AC75-548B9B9C2648}"/>
+          </ac:spMkLst>
+        </pc:spChg>
+        <pc:spChg chg="add del">
+          <ac:chgData name="JESUS ANTONIO PACHECO BALAM" userId="4d3f669a-bb26-43d9-97fa-e6e4457b6ec0" providerId="ADAL" clId="{42C36324-0F42-4A1C-A743-D757D7FC3EB1}" dt="2018-12-06T05:52:20.072" v="24" actId="26606"/>
+          <ac:spMkLst>
+            <pc:docMk/>
+            <pc:sldMk cId="704844681" sldId="270"/>
+            <ac:spMk id="51" creationId="{45CC6500-4DBD-4C34-BC14-2387FB483BEB}"/>
+          </ac:spMkLst>
+        </pc:spChg>
+        <pc:spChg chg="add del">
+          <ac:chgData name="JESUS ANTONIO PACHECO BALAM" userId="4d3f669a-bb26-43d9-97fa-e6e4457b6ec0" providerId="ADAL" clId="{42C36324-0F42-4A1C-A743-D757D7FC3EB1}" dt="2018-12-06T05:52:20.072" v="24" actId="26606"/>
+          <ac:spMkLst>
+            <pc:docMk/>
+            <pc:sldMk cId="704844681" sldId="270"/>
+            <ac:spMk id="52" creationId="{4E34A3B6-BAD2-4156-BDC6-4736248BFDE0}"/>
+          </ac:spMkLst>
+        </pc:spChg>
+        <pc:picChg chg="add del mod">
+          <ac:chgData name="JESUS ANTONIO PACHECO BALAM" userId="4d3f669a-bb26-43d9-97fa-e6e4457b6ec0" providerId="ADAL" clId="{42C36324-0F42-4A1C-A743-D757D7FC3EB1}" dt="2018-12-06T05:51:21.803" v="3"/>
+          <ac:picMkLst>
+            <pc:docMk/>
+            <pc:sldMk cId="704844681" sldId="270"/>
+            <ac:picMk id="3" creationId="{6A466E51-AC08-4F8F-83D6-AC900CFC0F5B}"/>
+          </ac:picMkLst>
+        </pc:picChg>
+        <pc:picChg chg="add mod modCrop">
+          <ac:chgData name="JESUS ANTONIO PACHECO BALAM" userId="4d3f669a-bb26-43d9-97fa-e6e4457b6ec0" providerId="ADAL" clId="{42C36324-0F42-4A1C-A743-D757D7FC3EB1}" dt="2018-12-06T05:57:39.078" v="42" actId="1076"/>
+          <ac:picMkLst>
+            <pc:docMk/>
+            <pc:sldMk cId="704844681" sldId="270"/>
+            <ac:picMk id="4" creationId="{4FF8843A-246B-4208-B4B1-FDBB5AB1F77B}"/>
+          </ac:picMkLst>
+        </pc:picChg>
+        <pc:picChg chg="del">
+          <ac:chgData name="JESUS ANTONIO PACHECO BALAM" userId="4d3f669a-bb26-43d9-97fa-e6e4457b6ec0" providerId="ADAL" clId="{42C36324-0F42-4A1C-A743-D757D7FC3EB1}" dt="2018-12-06T05:51:13.084" v="0"/>
+          <ac:picMkLst>
+            <pc:docMk/>
+            <pc:sldMk cId="704844681" sldId="270"/>
+            <ac:picMk id="6" creationId="{4484D0E7-0E00-4869-B554-721594C48BBE}"/>
+          </ac:picMkLst>
+        </pc:picChg>
+      </pc:sldChg>
+      <pc:sldChg chg="add">
+        <pc:chgData name="JESUS ANTONIO PACHECO BALAM" userId="4d3f669a-bb26-43d9-97fa-e6e4457b6ec0" providerId="ADAL" clId="{42C36324-0F42-4A1C-A743-D757D7FC3EB1}" dt="2018-12-06T05:53:08.158" v="30"/>
+        <pc:sldMkLst>
+          <pc:docMk/>
+          <pc:sldMk cId="360237256" sldId="272"/>
+        </pc:sldMkLst>
+      </pc:sldChg>
+      <pc:sldChg chg="add del">
+        <pc:chgData name="JESUS ANTONIO PACHECO BALAM" userId="4d3f669a-bb26-43d9-97fa-e6e4457b6ec0" providerId="ADAL" clId="{42C36324-0F42-4A1C-A743-D757D7FC3EB1}" dt="2018-12-06T05:53:12.797" v="36"/>
+        <pc:sldMkLst>
+          <pc:docMk/>
+          <pc:sldMk cId="806077280" sldId="273"/>
+        </pc:sldMkLst>
+      </pc:sldChg>
+      <pc:sldChg chg="add del">
+        <pc:chgData name="JESUS ANTONIO PACHECO BALAM" userId="4d3f669a-bb26-43d9-97fa-e6e4457b6ec0" providerId="ADAL" clId="{42C36324-0F42-4A1C-A743-D757D7FC3EB1}" dt="2018-12-06T05:53:12.133" v="35"/>
+        <pc:sldMkLst>
+          <pc:docMk/>
+          <pc:sldMk cId="1176343466" sldId="274"/>
+        </pc:sldMkLst>
+      </pc:sldChg>
+      <pc:sldChg chg="add del">
+        <pc:chgData name="JESUS ANTONIO PACHECO BALAM" userId="4d3f669a-bb26-43d9-97fa-e6e4457b6ec0" providerId="ADAL" clId="{42C36324-0F42-4A1C-A743-D757D7FC3EB1}" dt="2018-12-06T05:53:11.769" v="34"/>
+        <pc:sldMkLst>
+          <pc:docMk/>
+          <pc:sldMk cId="2784962874" sldId="275"/>
+        </pc:sldMkLst>
+      </pc:sldChg>
+    </pc:docChg>
+  </pc:docChgLst>
+</pc:chgInfo>
 </file>
 
 <file path=ppt/diagrams/colors1.xml><?xml version="1.0" encoding="utf-8"?>
@@ -10318,24 +10680,30 @@
             <p:ph type="title"/>
           </p:nvPr>
         </p:nvSpPr>
-        <p:spPr/>
+        <p:spPr>
+          <a:xfrm>
+            <a:off x="252919" y="1123837"/>
+            <a:ext cx="2947482" cy="4601183"/>
+          </a:xfrm>
+        </p:spPr>
         <p:txBody>
           <a:bodyPr/>
           <a:lstStyle/>
           <a:p>
             <a:r>
-              <a:rPr lang="es-MX" dirty="0"/>
+              <a:rPr lang="es-MX"/>
               <a:t>Diagrama de clases (paquetes): </a:t>
             </a:r>
+            <a:endParaRPr lang="es-MX" dirty="0"/>
           </a:p>
         </p:txBody>
       </p:sp>
       <p:pic>
         <p:nvPicPr>
-          <p:cNvPr id="6" name="Imagen 5" descr="Imagen que contiene texto&#10;&#10;Descripción generada con confianza muy alta">
+          <p:cNvPr id="4" name="Imagen 3">
             <a:extLst>
               <a:ext uri="{FF2B5EF4-FFF2-40B4-BE49-F238E27FC236}">
-                <a16:creationId xmlns:a16="http://schemas.microsoft.com/office/drawing/2014/main" id="{4484D0E7-0E00-4869-B554-721594C48BBE}"/>
+                <a16:creationId xmlns:a16="http://schemas.microsoft.com/office/drawing/2014/main" id="{4FF8843A-246B-4208-B4B1-FDBB5AB1F77B}"/>
               </a:ext>
             </a:extLst>
           </p:cNvPr>
@@ -10346,13 +10714,13 @@
         </p:nvPicPr>
         <p:blipFill rotWithShape="1">
           <a:blip r:embed="rId2"/>
-          <a:srcRect l="-447" r="447" b="23213"/>
+          <a:srcRect l="1292" t="8142" r="3540" b="38730"/>
           <a:stretch/>
         </p:blipFill>
         <p:spPr>
           <a:xfrm>
-            <a:off x="3719383" y="33146"/>
-            <a:ext cx="6844124" cy="6791708"/>
+            <a:off x="3931000" y="667318"/>
+            <a:ext cx="7655940" cy="5523364"/>
           </a:xfrm>
           <a:prstGeom prst="rect">
             <a:avLst/>
@@ -10373,6 +10741,61 @@
 </file>
 
 <file path=ppt/slides/slide12.xml><?xml version="1.0" encoding="utf-8"?>
+<p:sld xmlns:a="http://schemas.openxmlformats.org/drawingml/2006/main" xmlns:r="http://schemas.openxmlformats.org/officeDocument/2006/relationships" xmlns:p="http://schemas.openxmlformats.org/presentationml/2006/main">
+  <p:cSld>
+    <p:spTree>
+      <p:nvGrpSpPr>
+        <p:cNvPr id="1" name=""/>
+        <p:cNvGrpSpPr/>
+        <p:nvPr/>
+      </p:nvGrpSpPr>
+      <p:grpSpPr>
+        <a:xfrm>
+          <a:off x="0" y="0"/>
+          <a:ext cx="0" cy="0"/>
+          <a:chOff x="0" y="0"/>
+          <a:chExt cx="0" cy="0"/>
+        </a:xfrm>
+      </p:grpSpPr>
+      <p:sp>
+        <p:nvSpPr>
+          <p:cNvPr id="2" name="Título 1">
+            <a:extLst>
+              <a:ext uri="{FF2B5EF4-FFF2-40B4-BE49-F238E27FC236}">
+                <a16:creationId xmlns:a16="http://schemas.microsoft.com/office/drawing/2014/main" id="{5758F42B-028C-4A65-8BD1-C9CB25AC67E8}"/>
+              </a:ext>
+            </a:extLst>
+          </p:cNvPr>
+          <p:cNvSpPr>
+            <a:spLocks noGrp="1"/>
+          </p:cNvSpPr>
+          <p:nvPr>
+            <p:ph type="title"/>
+          </p:nvPr>
+        </p:nvSpPr>
+        <p:spPr/>
+        <p:txBody>
+          <a:bodyPr/>
+          <a:lstStyle/>
+          <a:p>
+            <a:endParaRPr lang="es-MX"/>
+          </a:p>
+        </p:txBody>
+      </p:sp>
+    </p:spTree>
+    <p:extLst>
+      <p:ext uri="{BB962C8B-B14F-4D97-AF65-F5344CB8AC3E}">
+        <p14:creationId xmlns:p14="http://schemas.microsoft.com/office/powerpoint/2010/main" val="360237256"/>
+      </p:ext>
+    </p:extLst>
+  </p:cSld>
+  <p:clrMapOvr>
+    <a:masterClrMapping/>
+  </p:clrMapOvr>
+</p:sld>
+</file>
+
+<file path=ppt/slides/slide13.xml><?xml version="1.0" encoding="utf-8"?>
 <p:sld xmlns:a="http://schemas.openxmlformats.org/drawingml/2006/main" xmlns:r="http://schemas.openxmlformats.org/officeDocument/2006/relationships" xmlns:p="http://schemas.openxmlformats.org/presentationml/2006/main">
   <p:cSld>
     <p:bg>
@@ -12451,7 +12874,7 @@
 </p:sld>
 </file>
 
-<file path=ppt/slides/slide13.xml><?xml version="1.0" encoding="utf-8"?>
+<file path=ppt/slides/slide14.xml><?xml version="1.0" encoding="utf-8"?>
 <p:sld xmlns:a="http://schemas.openxmlformats.org/drawingml/2006/main" xmlns:r="http://schemas.openxmlformats.org/officeDocument/2006/relationships" xmlns:p="http://schemas.openxmlformats.org/presentationml/2006/main">
   <p:cSld>
     <p:spTree>
@@ -14021,7 +14444,7 @@
 </p:sld>
 </file>
 
-<file path=ppt/slides/slide14.xml><?xml version="1.0" encoding="utf-8"?>
+<file path=ppt/slides/slide15.xml><?xml version="1.0" encoding="utf-8"?>
 <p:sld xmlns:a="http://schemas.openxmlformats.org/drawingml/2006/main" xmlns:r="http://schemas.openxmlformats.org/officeDocument/2006/relationships" xmlns:p="http://schemas.openxmlformats.org/presentationml/2006/main">
   <p:cSld>
     <p:spTree>

</xml_diff>

<commit_message>
actualizacion de datos y elegira la banda ms
</commit_message>
<xml_diff>
--- a/Presentación.pptx
+++ b/Presentación.pptx
@@ -129,7 +129,7 @@
 <file path=ppt/revisionInfo.xml><?xml version="1.0" encoding="utf-8"?>
 <p1510:revInfo xmlns:a="http://schemas.openxmlformats.org/drawingml/2006/main" xmlns:r="http://schemas.openxmlformats.org/officeDocument/2006/relationships" xmlns:p1510="http://schemas.microsoft.com/office/powerpoint/2015/10/main">
   <p1510:revLst>
-    <p1510:client id="{42C36324-0F42-4A1C-A743-D757D7FC3EB1}" v="11" dt="2018-12-06T05:53:12.824"/>
+    <p1510:client id="{42C36324-0F42-4A1C-A743-D757D7FC3EB1}" v="13" dt="2018-12-06T06:58:42.513"/>
   </p1510:revLst>
 </p1510:revInfo>
 </file>
@@ -139,7 +139,7 @@
   <pc:docChgLst>
     <pc:chgData name="JESUS ANTONIO PACHECO BALAM" userId="4d3f669a-bb26-43d9-97fa-e6e4457b6ec0" providerId="ADAL" clId="{42C36324-0F42-4A1C-A743-D757D7FC3EB1}"/>
     <pc:docChg chg="undo custSel mod addSld delSld modSld">
-      <pc:chgData name="JESUS ANTONIO PACHECO BALAM" userId="4d3f669a-bb26-43d9-97fa-e6e4457b6ec0" providerId="ADAL" clId="{42C36324-0F42-4A1C-A743-D757D7FC3EB1}" dt="2018-12-06T05:57:39.078" v="42" actId="1076"/>
+      <pc:chgData name="JESUS ANTONIO PACHECO BALAM" userId="4d3f669a-bb26-43d9-97fa-e6e4457b6ec0" providerId="ADAL" clId="{42C36324-0F42-4A1C-A743-D757D7FC3EB1}" dt="2018-12-06T06:58:46.489" v="105" actId="2696"/>
       <pc:docMkLst>
         <pc:docMk/>
       </pc:docMkLst>
@@ -454,18 +454,41 @@
           </ac:picMkLst>
         </pc:picChg>
       </pc:sldChg>
-      <pc:sldChg chg="add">
-        <pc:chgData name="JESUS ANTONIO PACHECO BALAM" userId="4d3f669a-bb26-43d9-97fa-e6e4457b6ec0" providerId="ADAL" clId="{42C36324-0F42-4A1C-A743-D757D7FC3EB1}" dt="2018-12-06T05:53:08.158" v="30"/>
+      <pc:sldChg chg="addSp modSp add">
+        <pc:chgData name="JESUS ANTONIO PACHECO BALAM" userId="4d3f669a-bb26-43d9-97fa-e6e4457b6ec0" providerId="ADAL" clId="{42C36324-0F42-4A1C-A743-D757D7FC3EB1}" dt="2018-12-06T06:58:40.172" v="103" actId="20577"/>
         <pc:sldMkLst>
           <pc:docMk/>
           <pc:sldMk cId="360237256" sldId="272"/>
         </pc:sldMkLst>
+        <pc:spChg chg="mod">
+          <ac:chgData name="JESUS ANTONIO PACHECO BALAM" userId="4d3f669a-bb26-43d9-97fa-e6e4457b6ec0" providerId="ADAL" clId="{42C36324-0F42-4A1C-A743-D757D7FC3EB1}" dt="2018-12-06T06:58:40.172" v="103" actId="20577"/>
+          <ac:spMkLst>
+            <pc:docMk/>
+            <pc:sldMk cId="360237256" sldId="272"/>
+            <ac:spMk id="2" creationId="{5758F42B-028C-4A65-8BD1-C9CB25AC67E8}"/>
+          </ac:spMkLst>
+        </pc:spChg>
+        <pc:picChg chg="add mod modCrop">
+          <ac:chgData name="JESUS ANTONIO PACHECO BALAM" userId="4d3f669a-bb26-43d9-97fa-e6e4457b6ec0" providerId="ADAL" clId="{42C36324-0F42-4A1C-A743-D757D7FC3EB1}" dt="2018-12-06T06:58:23.026" v="56" actId="1076"/>
+          <ac:picMkLst>
+            <pc:docMk/>
+            <pc:sldMk cId="360237256" sldId="272"/>
+            <ac:picMk id="3" creationId="{77FDCB40-1146-4214-A9F9-2CF14D5AE0F2}"/>
+          </ac:picMkLst>
+        </pc:picChg>
       </pc:sldChg>
       <pc:sldChg chg="add del">
         <pc:chgData name="JESUS ANTONIO PACHECO BALAM" userId="4d3f669a-bb26-43d9-97fa-e6e4457b6ec0" providerId="ADAL" clId="{42C36324-0F42-4A1C-A743-D757D7FC3EB1}" dt="2018-12-06T05:53:12.797" v="36"/>
         <pc:sldMkLst>
           <pc:docMk/>
           <pc:sldMk cId="806077280" sldId="273"/>
+        </pc:sldMkLst>
+      </pc:sldChg>
+      <pc:sldChg chg="add del">
+        <pc:chgData name="JESUS ANTONIO PACHECO BALAM" userId="4d3f669a-bb26-43d9-97fa-e6e4457b6ec0" providerId="ADAL" clId="{42C36324-0F42-4A1C-A743-D757D7FC3EB1}" dt="2018-12-06T06:58:46.489" v="105" actId="2696"/>
+        <pc:sldMkLst>
+          <pc:docMk/>
+          <pc:sldMk cId="2184123634" sldId="273"/>
         </pc:sldMkLst>
       </pc:sldChg>
       <pc:sldChg chg="add del">
@@ -6838,7 +6861,7 @@
             <a:fld id="{5586B75A-687E-405C-8A0B-8D00578BA2C3}" type="datetimeFigureOut">
               <a:rPr lang="en-US" dirty="0"/>
               <a:pPr/>
-              <a:t>12/5/2018</a:t>
+              <a:t>12/6/2018</a:t>
             </a:fld>
             <a:endParaRPr lang="en-US" dirty="0"/>
           </a:p>
@@ -7005,7 +7028,7 @@
             <a:fld id="{5586B75A-687E-405C-8A0B-8D00578BA2C3}" type="datetimeFigureOut">
               <a:rPr lang="en-US" dirty="0"/>
               <a:pPr/>
-              <a:t>12/5/2018</a:t>
+              <a:t>12/6/2018</a:t>
             </a:fld>
             <a:endParaRPr lang="en-US" dirty="0"/>
           </a:p>
@@ -7182,7 +7205,7 @@
             <a:fld id="{5586B75A-687E-405C-8A0B-8D00578BA2C3}" type="datetimeFigureOut">
               <a:rPr lang="en-US" dirty="0"/>
               <a:pPr/>
-              <a:t>12/5/2018</a:t>
+              <a:t>12/6/2018</a:t>
             </a:fld>
             <a:endParaRPr lang="en-US" dirty="0"/>
           </a:p>
@@ -7349,7 +7372,7 @@
             <a:fld id="{5586B75A-687E-405C-8A0B-8D00578BA2C3}" type="datetimeFigureOut">
               <a:rPr lang="en-US" dirty="0"/>
               <a:pPr/>
-              <a:t>12/5/2018</a:t>
+              <a:t>12/6/2018</a:t>
             </a:fld>
             <a:endParaRPr lang="en-US" dirty="0"/>
           </a:p>
@@ -7604,7 +7627,7 @@
             <a:fld id="{5586B75A-687E-405C-8A0B-8D00578BA2C3}" type="datetimeFigureOut">
               <a:rPr lang="en-US" dirty="0"/>
               <a:pPr/>
-              <a:t>12/5/2018</a:t>
+              <a:t>12/6/2018</a:t>
             </a:fld>
             <a:endParaRPr lang="en-US" dirty="0"/>
           </a:p>
@@ -7889,7 +7912,7 @@
             <a:fld id="{5586B75A-687E-405C-8A0B-8D00578BA2C3}" type="datetimeFigureOut">
               <a:rPr lang="en-US" dirty="0"/>
               <a:pPr/>
-              <a:t>12/5/2018</a:t>
+              <a:t>12/6/2018</a:t>
             </a:fld>
             <a:endParaRPr lang="en-US" dirty="0"/>
           </a:p>
@@ -8328,7 +8351,7 @@
             <a:fld id="{5586B75A-687E-405C-8A0B-8D00578BA2C3}" type="datetimeFigureOut">
               <a:rPr lang="en-US" dirty="0"/>
               <a:pPr/>
-              <a:t>12/5/2018</a:t>
+              <a:t>12/6/2018</a:t>
             </a:fld>
             <a:endParaRPr lang="en-US" dirty="0"/>
           </a:p>
@@ -8443,7 +8466,7 @@
             <a:fld id="{5586B75A-687E-405C-8A0B-8D00578BA2C3}" type="datetimeFigureOut">
               <a:rPr lang="en-US" dirty="0"/>
               <a:pPr/>
-              <a:t>12/5/2018</a:t>
+              <a:t>12/6/2018</a:t>
             </a:fld>
             <a:endParaRPr lang="en-US" dirty="0"/>
           </a:p>
@@ -8535,7 +8558,7 @@
             <a:fld id="{5586B75A-687E-405C-8A0B-8D00578BA2C3}" type="datetimeFigureOut">
               <a:rPr lang="en-US" dirty="0"/>
               <a:pPr/>
-              <a:t>12/5/2018</a:t>
+              <a:t>12/6/2018</a:t>
             </a:fld>
             <a:endParaRPr lang="en-US" dirty="0"/>
           </a:p>
@@ -8820,7 +8843,7 @@
             <a:fld id="{5586B75A-687E-405C-8A0B-8D00578BA2C3}" type="datetimeFigureOut">
               <a:rPr lang="en-US" dirty="0"/>
               <a:pPr/>
-              <a:t>12/5/2018</a:t>
+              <a:t>12/6/2018</a:t>
             </a:fld>
             <a:endParaRPr lang="en-US" dirty="0"/>
           </a:p>
@@ -9090,7 +9113,7 @@
             <a:fld id="{5586B75A-687E-405C-8A0B-8D00578BA2C3}" type="datetimeFigureOut">
               <a:rPr lang="en-US" dirty="0"/>
               <a:pPr/>
-              <a:t>12/5/2018</a:t>
+              <a:t>12/6/2018</a:t>
             </a:fld>
             <a:endParaRPr lang="en-US" dirty="0"/>
           </a:p>
@@ -9384,7 +9407,7 @@
             <a:fld id="{5586B75A-687E-405C-8A0B-8D00578BA2C3}" type="datetimeFigureOut">
               <a:rPr lang="en-US" dirty="0"/>
               <a:pPr/>
-              <a:t>12/5/2018</a:t>
+              <a:t>12/6/2018</a:t>
             </a:fld>
             <a:endParaRPr lang="en-US" dirty="0"/>
           </a:p>
@@ -10778,10 +10801,42 @@
           <a:bodyPr/>
           <a:lstStyle/>
           <a:p>
-            <a:endParaRPr lang="es-MX"/>
+            <a:r>
+              <a:rPr lang="es-MX" dirty="0"/>
+              <a:t>Ejemplo de un diagrama de paquetes</a:t>
+            </a:r>
           </a:p>
         </p:txBody>
       </p:sp>
+      <p:pic>
+        <p:nvPicPr>
+          <p:cNvPr id="3" name="Imagen 2">
+            <a:extLst>
+              <a:ext uri="{FF2B5EF4-FFF2-40B4-BE49-F238E27FC236}">
+                <a16:creationId xmlns:a16="http://schemas.microsoft.com/office/drawing/2014/main" id="{77FDCB40-1146-4214-A9F9-2CF14D5AE0F2}"/>
+              </a:ext>
+            </a:extLst>
+          </p:cNvPr>
+          <p:cNvPicPr>
+            <a:picLocks noChangeAspect="1"/>
+          </p:cNvPicPr>
+          <p:nvPr/>
+        </p:nvPicPr>
+        <p:blipFill rotWithShape="1">
+          <a:blip r:embed="rId2"/>
+          <a:srcRect l="31500" t="18137" r="35385" b="9923"/>
+          <a:stretch/>
+        </p:blipFill>
+        <p:spPr>
+          <a:xfrm>
+            <a:off x="4881788" y="453683"/>
+            <a:ext cx="4872084" cy="5950634"/>
+          </a:xfrm>
+          <a:prstGeom prst="rect">
+            <a:avLst/>
+          </a:prstGeom>
+        </p:spPr>
+      </p:pic>
     </p:spTree>
     <p:extLst>
       <p:ext uri="{BB962C8B-B14F-4D97-AF65-F5344CB8AC3E}">

</xml_diff>